<commit_message>
Updated git content with Teams content from 22 January 2024
</commit_message>
<xml_diff>
--- a/01-PresentationCreationObjet/Atelier 4 – Moniteur Graphique.pptx
+++ b/01-PresentationCreationObjet/Atelier 4 – Moniteur Graphique.pptx
@@ -241,7 +241,7 @@
           <a:p>
             <a:fld id="{75243B43-F286-48C1-BBED-D571E17C6AE3}" type="datetimeFigureOut">
               <a:rPr lang="en-US" smtClean="0"/>
-              <a:t>11/28/2023</a:t>
+              <a:t>12/4/2023</a:t>
             </a:fld>
             <a:endParaRPr lang="en-US"/>
           </a:p>
@@ -552,7 +552,7 @@
           <a:bodyPr/>
           <a:lstStyle/>
           <a:p>
-            <a:endParaRPr lang="en-US" dirty="0"/>
+            <a:endParaRPr lang="en-US"/>
           </a:p>
         </p:txBody>
       </p:sp>
@@ -575,7 +575,7 @@
               <a:rPr lang="en-US" smtClean="0"/>
               <a:t>1</a:t>
             </a:fld>
-            <a:endParaRPr lang="en-US" dirty="0"/>
+            <a:endParaRPr lang="en-US"/>
           </a:p>
         </p:txBody>
       </p:sp>
@@ -636,7 +636,7 @@
           <a:bodyPr/>
           <a:lstStyle/>
           <a:p>
-            <a:endParaRPr lang="en-US" dirty="0"/>
+            <a:endParaRPr lang="en-US"/>
           </a:p>
         </p:txBody>
       </p:sp>
@@ -659,7 +659,7 @@
               <a:rPr lang="en-US" smtClean="0"/>
               <a:t>2</a:t>
             </a:fld>
-            <a:endParaRPr lang="en-US" dirty="0"/>
+            <a:endParaRPr lang="en-US"/>
           </a:p>
         </p:txBody>
       </p:sp>
@@ -720,7 +720,7 @@
           <a:bodyPr/>
           <a:lstStyle/>
           <a:p>
-            <a:endParaRPr lang="en-US" dirty="0"/>
+            <a:endParaRPr lang="en-US"/>
           </a:p>
         </p:txBody>
       </p:sp>
@@ -743,7 +743,7 @@
               <a:rPr lang="en-US" smtClean="0"/>
               <a:t>3</a:t>
             </a:fld>
-            <a:endParaRPr lang="en-US" dirty="0"/>
+            <a:endParaRPr lang="en-US"/>
           </a:p>
         </p:txBody>
       </p:sp>
@@ -804,7 +804,7 @@
           <a:bodyPr/>
           <a:lstStyle/>
           <a:p>
-            <a:endParaRPr lang="en-US" dirty="0"/>
+            <a:endParaRPr lang="en-US"/>
           </a:p>
         </p:txBody>
       </p:sp>
@@ -827,7 +827,7 @@
               <a:rPr lang="en-US" smtClean="0"/>
               <a:t>4</a:t>
             </a:fld>
-            <a:endParaRPr lang="en-US" dirty="0"/>
+            <a:endParaRPr lang="en-US"/>
           </a:p>
         </p:txBody>
       </p:sp>
@@ -888,7 +888,7 @@
           <a:bodyPr/>
           <a:lstStyle/>
           <a:p>
-            <a:endParaRPr lang="en-US" dirty="0"/>
+            <a:endParaRPr lang="en-US"/>
           </a:p>
         </p:txBody>
       </p:sp>
@@ -911,7 +911,7 @@
               <a:rPr lang="en-US" smtClean="0"/>
               <a:t>5</a:t>
             </a:fld>
-            <a:endParaRPr lang="en-US" dirty="0"/>
+            <a:endParaRPr lang="en-US"/>
           </a:p>
         </p:txBody>
       </p:sp>
@@ -972,7 +972,7 @@
           <a:bodyPr/>
           <a:lstStyle/>
           <a:p>
-            <a:endParaRPr lang="en-US" dirty="0"/>
+            <a:endParaRPr lang="en-US"/>
           </a:p>
         </p:txBody>
       </p:sp>
@@ -995,7 +995,7 @@
               <a:rPr lang="en-US" smtClean="0"/>
               <a:t>6</a:t>
             </a:fld>
-            <a:endParaRPr lang="en-US" dirty="0"/>
+            <a:endParaRPr lang="en-US"/>
           </a:p>
         </p:txBody>
       </p:sp>
@@ -1056,7 +1056,7 @@
           <a:bodyPr/>
           <a:lstStyle/>
           <a:p>
-            <a:endParaRPr lang="en-US" dirty="0"/>
+            <a:endParaRPr lang="en-US"/>
           </a:p>
         </p:txBody>
       </p:sp>
@@ -1079,7 +1079,7 @@
               <a:rPr lang="en-US" smtClean="0"/>
               <a:t>7</a:t>
             </a:fld>
-            <a:endParaRPr lang="en-US" dirty="0"/>
+            <a:endParaRPr lang="en-US"/>
           </a:p>
         </p:txBody>
       </p:sp>
@@ -1156,10 +1156,10 @@
           </a:lstStyle>
           <a:p>
             <a:r>
-              <a:rPr lang="en-US" dirty="0"/>
+              <a:rPr lang="en-US"/>
               <a:t>Presentation title</a:t>
             </a:r>
-            <a:endParaRPr lang="fr-FR" dirty="0"/>
+            <a:endParaRPr lang="fr-FR"/>
           </a:p>
         </p:txBody>
       </p:sp>
@@ -1231,10 +1231,10 @@
           </a:lstStyle>
           <a:p>
             <a:r>
-              <a:rPr lang="en-US" dirty="0"/>
+              <a:rPr lang="en-US"/>
               <a:t>Presenter</a:t>
             </a:r>
-            <a:endParaRPr lang="fr-FR" dirty="0"/>
+            <a:endParaRPr lang="fr-FR"/>
           </a:p>
         </p:txBody>
       </p:sp>
@@ -1286,7 +1286,7 @@
           <a:lstStyle/>
           <a:p>
             <a:pPr algn="ctr"/>
-            <a:endParaRPr lang="en-US" dirty="0"/>
+            <a:endParaRPr lang="en-US"/>
           </a:p>
         </p:txBody>
       </p:sp>
@@ -1433,14 +1433,14 @@
           </a:lstStyle>
           <a:p>
             <a:r>
-              <a:rPr lang="en-US" dirty="0"/>
+              <a:rPr lang="en-US"/>
               <a:t>Drag and drop </a:t>
             </a:r>
             <a:br>
-              <a:rPr lang="en-US" dirty="0"/>
+              <a:rPr lang="en-US"/>
             </a:br>
             <a:r>
-              <a:rPr lang="en-US" dirty="0"/>
+              <a:rPr lang="en-US"/>
               <a:t>a picture here</a:t>
             </a:r>
           </a:p>
@@ -1545,10 +1545,10 @@
           </a:lstStyle>
           <a:p>
             <a:r>
-              <a:rPr lang="en-US" dirty="0"/>
+              <a:rPr lang="en-US"/>
               <a:t>Presentation title</a:t>
             </a:r>
-            <a:endParaRPr lang="fr-FR" dirty="0"/>
+            <a:endParaRPr lang="fr-FR"/>
           </a:p>
         </p:txBody>
       </p:sp>
@@ -1620,10 +1620,10 @@
           </a:lstStyle>
           <a:p>
             <a:r>
-              <a:rPr lang="en-US" dirty="0"/>
+              <a:rPr lang="en-US"/>
               <a:t>Presenter</a:t>
             </a:r>
-            <a:endParaRPr lang="fr-FR" dirty="0"/>
+            <a:endParaRPr lang="fr-FR"/>
           </a:p>
         </p:txBody>
       </p:sp>
@@ -1783,7 +1783,7 @@
           <a:lstStyle/>
           <a:p>
             <a:pPr algn="ctr"/>
-            <a:endParaRPr lang="en-US" dirty="0"/>
+            <a:endParaRPr lang="en-US"/>
           </a:p>
         </p:txBody>
       </p:sp>
@@ -1867,35 +1867,35 @@
           <a:p>
             <a:pPr lvl="0"/>
             <a:r>
-              <a:rPr lang="en-US" dirty="0"/>
+              <a:rPr lang="en-US"/>
               <a:t>First level text</a:t>
             </a:r>
           </a:p>
           <a:p>
             <a:pPr lvl="1"/>
             <a:r>
-              <a:rPr lang="en-US" dirty="0"/>
+              <a:rPr lang="en-US"/>
               <a:t>Second level</a:t>
             </a:r>
           </a:p>
           <a:p>
             <a:pPr lvl="2"/>
             <a:r>
-              <a:rPr lang="en-US" dirty="0"/>
+              <a:rPr lang="en-US"/>
               <a:t>Third level</a:t>
             </a:r>
           </a:p>
           <a:p>
             <a:pPr lvl="3"/>
             <a:r>
-              <a:rPr lang="en-US" dirty="0"/>
+              <a:rPr lang="en-US"/>
               <a:t>Fourth level</a:t>
             </a:r>
           </a:p>
           <a:p>
             <a:pPr lvl="4"/>
             <a:r>
-              <a:rPr lang="en-US" dirty="0"/>
+              <a:rPr lang="en-US"/>
               <a:t>Fifth level</a:t>
             </a:r>
           </a:p>
@@ -1921,7 +1921,7 @@
           </a:lstStyle>
           <a:p>
             <a:r>
-              <a:rPr lang="en-US" dirty="0"/>
+              <a:rPr lang="en-US"/>
               <a:t>Slide title</a:t>
             </a:r>
           </a:p>
@@ -1950,7 +1950,7 @@
           <a:p>
             <a:fld id="{33052DD4-CDE3-4E33-AB80-AED4CE4AC39A}" type="datetimeFigureOut">
               <a:rPr lang="en-US" smtClean="0"/>
-              <a:t>11/28/2023</a:t>
+              <a:t>12/4/2023</a:t>
             </a:fld>
             <a:endParaRPr lang="en-US"/>
           </a:p>
@@ -2109,7 +2109,7 @@
           <a:p>
             <a:pPr lvl="0"/>
             <a:r>
-              <a:rPr lang="en-US" dirty="0"/>
+              <a:rPr lang="en-US"/>
               <a:t>Section title</a:t>
             </a:r>
           </a:p>
@@ -2307,7 +2307,7 @@
           <a:p>
             <a:pPr marL="261938" lvl="0" indent="-261938" algn="ctr"/>
             <a:r>
-              <a:rPr lang="en-US" dirty="0"/>
+              <a:rPr lang="en-US"/>
               <a:t>Drag and drop a picture here (optional)</a:t>
             </a:r>
           </a:p>
@@ -2386,35 +2386,35 @@
           <a:p>
             <a:pPr lvl="0"/>
             <a:r>
-              <a:rPr lang="en-US" dirty="0"/>
+              <a:rPr lang="en-US"/>
               <a:t>First level text</a:t>
             </a:r>
           </a:p>
           <a:p>
             <a:pPr lvl="1"/>
             <a:r>
-              <a:rPr lang="en-US" dirty="0"/>
+              <a:rPr lang="en-US"/>
               <a:t>Second level</a:t>
             </a:r>
           </a:p>
           <a:p>
             <a:pPr lvl="2"/>
             <a:r>
-              <a:rPr lang="en-US" dirty="0"/>
+              <a:rPr lang="en-US"/>
               <a:t>Third level</a:t>
             </a:r>
           </a:p>
           <a:p>
             <a:pPr lvl="3"/>
             <a:r>
-              <a:rPr lang="en-US" dirty="0"/>
+              <a:rPr lang="en-US"/>
               <a:t>Fourth level</a:t>
             </a:r>
           </a:p>
           <a:p>
             <a:pPr lvl="4"/>
             <a:r>
-              <a:rPr lang="en-US" dirty="0"/>
+              <a:rPr lang="en-US"/>
               <a:t>Fifth level</a:t>
             </a:r>
           </a:p>
@@ -2446,35 +2446,35 @@
           <a:p>
             <a:pPr lvl="0"/>
             <a:r>
-              <a:rPr lang="en-US" dirty="0"/>
+              <a:rPr lang="en-US"/>
               <a:t>First level text</a:t>
             </a:r>
           </a:p>
           <a:p>
             <a:pPr lvl="1"/>
             <a:r>
-              <a:rPr lang="en-US" dirty="0"/>
+              <a:rPr lang="en-US"/>
               <a:t>Second level</a:t>
             </a:r>
           </a:p>
           <a:p>
             <a:pPr lvl="2"/>
             <a:r>
-              <a:rPr lang="en-US" dirty="0"/>
+              <a:rPr lang="en-US"/>
               <a:t>Third level</a:t>
             </a:r>
           </a:p>
           <a:p>
             <a:pPr lvl="3"/>
             <a:r>
-              <a:rPr lang="en-US" dirty="0"/>
+              <a:rPr lang="en-US"/>
               <a:t>Fourth level</a:t>
             </a:r>
           </a:p>
           <a:p>
             <a:pPr lvl="4"/>
             <a:r>
-              <a:rPr lang="en-US" dirty="0"/>
+              <a:rPr lang="en-US"/>
               <a:t>Fifth level</a:t>
             </a:r>
           </a:p>
@@ -2500,7 +2500,7 @@
           </a:lstStyle>
           <a:p>
             <a:r>
-              <a:rPr lang="en-US" dirty="0"/>
+              <a:rPr lang="en-US"/>
               <a:t>Slide title</a:t>
             </a:r>
           </a:p>
@@ -2529,7 +2529,7 @@
           <a:p>
             <a:fld id="{33052DD4-CDE3-4E33-AB80-AED4CE4AC39A}" type="datetimeFigureOut">
               <a:rPr lang="en-US" smtClean="0"/>
-              <a:t>11/28/2023</a:t>
+              <a:t>12/4/2023</a:t>
             </a:fld>
             <a:endParaRPr lang="en-US"/>
           </a:p>
@@ -2665,7 +2665,7 @@
           </a:lstStyle>
           <a:p>
             <a:r>
-              <a:rPr lang="en-US" dirty="0"/>
+              <a:rPr lang="en-US"/>
               <a:t>Slide title</a:t>
             </a:r>
           </a:p>
@@ -2694,7 +2694,7 @@
           <a:p>
             <a:fld id="{33052DD4-CDE3-4E33-AB80-AED4CE4AC39A}" type="datetimeFigureOut">
               <a:rPr lang="en-US" smtClean="0"/>
-              <a:t>11/28/2023</a:t>
+              <a:t>12/4/2023</a:t>
             </a:fld>
             <a:endParaRPr lang="en-US"/>
           </a:p>
@@ -2838,7 +2838,7 @@
           <a:p>
             <a:fld id="{33052DD4-CDE3-4E33-AB80-AED4CE4AC39A}" type="datetimeFigureOut">
               <a:rPr lang="en-US" smtClean="0"/>
-              <a:t>11/28/2023</a:t>
+              <a:t>12/4/2023</a:t>
             </a:fld>
             <a:endParaRPr lang="en-US"/>
           </a:p>
@@ -3022,7 +3022,7 @@
             <a:lstStyle/>
             <a:p>
               <a:pPr algn="ctr"/>
-              <a:endParaRPr lang="en-US" dirty="0"/>
+              <a:endParaRPr lang="en-US"/>
             </a:p>
           </p:txBody>
         </p:sp>
@@ -3171,7 +3171,7 @@
               <a:lstStyle/>
               <a:p>
                 <a:pPr algn="ctr"/>
-                <a:endParaRPr lang="en-US" dirty="0"/>
+                <a:endParaRPr lang="en-US"/>
               </a:p>
             </p:txBody>
           </p:sp>
@@ -3203,7 +3203,7 @@
               <a:lstStyle/>
               <a:p>
                 <a:r>
-                  <a:rPr lang="en-US" sz="1200" dirty="0">
+                  <a:rPr lang="en-US" sz="1200">
                     <a:solidFill>
                       <a:srgbClr val="00234B"/>
                     </a:solidFill>
@@ -3212,7 +3212,7 @@
                   <a:t>© STMicroelectronics - All rights reserved.</a:t>
                 </a:r>
                 <a:br>
-                  <a:rPr lang="en-US" sz="1200" dirty="0">
+                  <a:rPr lang="en-US" sz="1200">
                     <a:solidFill>
                       <a:srgbClr val="00234B"/>
                     </a:solidFill>
@@ -3220,7 +3220,7 @@
                   </a:rPr>
                 </a:br>
                 <a:r>
-                  <a:rPr lang="en-US" sz="1200" kern="1200" dirty="0">
+                  <a:rPr lang="en-US" sz="1200" kern="1200">
                     <a:solidFill>
                       <a:srgbClr val="00234B"/>
                     </a:solidFill>
@@ -3231,7 +3231,7 @@
                   <a:t>ST logo is a trademark or a registered trademark of STMicroelectronics International NV or its affiliates in the EU and/or other countries. For additional information about ST trademarks, please refer to </a:t>
                 </a:r>
                 <a:r>
-                  <a:rPr lang="en-US" sz="1200" kern="1200" dirty="0">
+                  <a:rPr lang="en-US" sz="1200" kern="1200">
                     <a:solidFill>
                       <a:srgbClr val="00234B"/>
                     </a:solidFill>
@@ -3249,7 +3249,7 @@
                   <a:t>www.st.com/trademarks</a:t>
                 </a:r>
                 <a:r>
-                  <a:rPr lang="en-US" sz="1200" kern="1200" dirty="0">
+                  <a:rPr lang="en-US" sz="1200" kern="1200">
                     <a:solidFill>
                       <a:srgbClr val="00234B"/>
                     </a:solidFill>
@@ -3260,7 +3260,7 @@
                   <a:t>. </a:t>
                 </a:r>
                 <a:br>
-                  <a:rPr lang="en-US" sz="1200" kern="1200" dirty="0">
+                  <a:rPr lang="en-US" sz="1200" kern="1200">
                     <a:solidFill>
                       <a:srgbClr val="00234B"/>
                     </a:solidFill>
@@ -3270,7 +3270,7 @@
                   </a:rPr>
                 </a:br>
                 <a:r>
-                  <a:rPr lang="en-US" sz="1200" kern="1200" dirty="0">
+                  <a:rPr lang="en-US" sz="1200" kern="1200">
                     <a:solidFill>
                       <a:srgbClr val="00234B"/>
                     </a:solidFill>
@@ -3441,7 +3441,7 @@
                 <a:schemeClr val="bg1"/>
               </a:buClr>
             </a:pPr>
-            <a:endParaRPr lang="en-US" dirty="0" err="1"/>
+            <a:endParaRPr lang="en-US" err="1"/>
           </a:p>
         </p:txBody>
       </p:sp>
@@ -3497,7 +3497,7 @@
                 <a:schemeClr val="bg1"/>
               </a:buClr>
             </a:pPr>
-            <a:endParaRPr lang="en-US" dirty="0" err="1"/>
+            <a:endParaRPr lang="en-US" err="1"/>
           </a:p>
         </p:txBody>
       </p:sp>
@@ -3553,7 +3553,7 @@
                 <a:schemeClr val="bg1"/>
               </a:buClr>
             </a:pPr>
-            <a:endParaRPr lang="en-US" dirty="0" err="1"/>
+            <a:endParaRPr lang="en-US" err="1"/>
           </a:p>
         </p:txBody>
       </p:sp>
@@ -3609,7 +3609,7 @@
                 <a:schemeClr val="bg1"/>
               </a:buClr>
             </a:pPr>
-            <a:endParaRPr lang="en-US" dirty="0" err="1"/>
+            <a:endParaRPr lang="en-US" err="1"/>
           </a:p>
         </p:txBody>
       </p:sp>
@@ -3665,7 +3665,7 @@
                 <a:schemeClr val="bg1"/>
               </a:buClr>
             </a:pPr>
-            <a:endParaRPr lang="en-US" dirty="0" err="1"/>
+            <a:endParaRPr lang="en-US" err="1"/>
           </a:p>
         </p:txBody>
       </p:sp>
@@ -3721,7 +3721,7 @@
                 <a:schemeClr val="bg1"/>
               </a:buClr>
             </a:pPr>
-            <a:endParaRPr lang="en-US" dirty="0" err="1"/>
+            <a:endParaRPr lang="en-US" err="1"/>
           </a:p>
         </p:txBody>
       </p:sp>
@@ -3777,7 +3777,7 @@
                 <a:schemeClr val="bg1"/>
               </a:buClr>
             </a:pPr>
-            <a:endParaRPr lang="en-US" dirty="0" err="1"/>
+            <a:endParaRPr lang="en-US" err="1"/>
           </a:p>
         </p:txBody>
       </p:sp>
@@ -3833,7 +3833,7 @@
                 <a:schemeClr val="bg1"/>
               </a:buClr>
             </a:pPr>
-            <a:endParaRPr lang="en-US" dirty="0" err="1"/>
+            <a:endParaRPr lang="en-US" err="1"/>
           </a:p>
         </p:txBody>
       </p:sp>
@@ -3889,7 +3889,7 @@
                 <a:schemeClr val="bg1"/>
               </a:buClr>
             </a:pPr>
-            <a:endParaRPr lang="en-US" dirty="0" err="1"/>
+            <a:endParaRPr lang="en-US" err="1"/>
           </a:p>
         </p:txBody>
       </p:sp>
@@ -3945,7 +3945,7 @@
                 <a:schemeClr val="bg1"/>
               </a:buClr>
             </a:pPr>
-            <a:endParaRPr lang="en-US" dirty="0" err="1"/>
+            <a:endParaRPr lang="en-US" err="1"/>
           </a:p>
         </p:txBody>
       </p:sp>
@@ -4001,7 +4001,7 @@
                 <a:schemeClr val="bg1"/>
               </a:buClr>
             </a:pPr>
-            <a:endParaRPr lang="en-US" dirty="0" err="1"/>
+            <a:endParaRPr lang="en-US" err="1"/>
           </a:p>
         </p:txBody>
       </p:sp>
@@ -4057,7 +4057,7 @@
                 <a:schemeClr val="bg1"/>
               </a:buClr>
             </a:pPr>
-            <a:endParaRPr lang="en-US" dirty="0" err="1"/>
+            <a:endParaRPr lang="en-US" err="1"/>
           </a:p>
         </p:txBody>
       </p:sp>
@@ -4113,7 +4113,7 @@
                 <a:schemeClr val="bg1"/>
               </a:buClr>
             </a:pPr>
-            <a:endParaRPr lang="en-US" dirty="0" err="1"/>
+            <a:endParaRPr lang="en-US" err="1"/>
           </a:p>
         </p:txBody>
       </p:sp>
@@ -4169,7 +4169,7 @@
                 <a:schemeClr val="bg1"/>
               </a:buClr>
             </a:pPr>
-            <a:endParaRPr lang="en-US" dirty="0" err="1"/>
+            <a:endParaRPr lang="en-US" err="1"/>
           </a:p>
         </p:txBody>
       </p:sp>
@@ -4225,7 +4225,7 @@
                 <a:schemeClr val="bg1"/>
               </a:buClr>
             </a:pPr>
-            <a:endParaRPr lang="en-US" dirty="0" err="1"/>
+            <a:endParaRPr lang="en-US" err="1"/>
           </a:p>
         </p:txBody>
       </p:sp>
@@ -4281,7 +4281,7 @@
                 <a:schemeClr val="bg1"/>
               </a:buClr>
             </a:pPr>
-            <a:endParaRPr lang="en-US" dirty="0" err="1"/>
+            <a:endParaRPr lang="en-US" err="1"/>
           </a:p>
         </p:txBody>
       </p:sp>
@@ -4337,7 +4337,7 @@
                 <a:schemeClr val="bg1"/>
               </a:buClr>
             </a:pPr>
-            <a:endParaRPr lang="en-US" dirty="0" err="1"/>
+            <a:endParaRPr lang="en-US" err="1"/>
           </a:p>
         </p:txBody>
       </p:sp>
@@ -4393,7 +4393,7 @@
                 <a:schemeClr val="bg1"/>
               </a:buClr>
             </a:pPr>
-            <a:endParaRPr lang="en-US" dirty="0" err="1"/>
+            <a:endParaRPr lang="en-US" err="1"/>
           </a:p>
         </p:txBody>
       </p:sp>
@@ -4449,7 +4449,7 @@
                 <a:schemeClr val="bg1"/>
               </a:buClr>
             </a:pPr>
-            <a:endParaRPr lang="en-US" dirty="0" err="1"/>
+            <a:endParaRPr lang="en-US" err="1"/>
           </a:p>
         </p:txBody>
       </p:sp>
@@ -4505,7 +4505,7 @@
                 <a:schemeClr val="bg1"/>
               </a:buClr>
             </a:pPr>
-            <a:endParaRPr lang="en-US" dirty="0" err="1"/>
+            <a:endParaRPr lang="en-US" err="1"/>
           </a:p>
         </p:txBody>
       </p:sp>
@@ -4561,7 +4561,7 @@
                 <a:schemeClr val="bg1"/>
               </a:buClr>
             </a:pPr>
-            <a:endParaRPr lang="en-US" dirty="0" err="1"/>
+            <a:endParaRPr lang="en-US" err="1"/>
           </a:p>
         </p:txBody>
       </p:sp>
@@ -4617,7 +4617,7 @@
                 <a:schemeClr val="bg1"/>
               </a:buClr>
             </a:pPr>
-            <a:endParaRPr lang="en-US" dirty="0" err="1"/>
+            <a:endParaRPr lang="en-US" err="1"/>
           </a:p>
         </p:txBody>
       </p:sp>
@@ -4673,7 +4673,7 @@
                 <a:schemeClr val="bg1"/>
               </a:buClr>
             </a:pPr>
-            <a:endParaRPr lang="en-US" dirty="0" err="1"/>
+            <a:endParaRPr lang="en-US" err="1"/>
           </a:p>
         </p:txBody>
       </p:sp>
@@ -4729,7 +4729,7 @@
                 <a:schemeClr val="bg1"/>
               </a:buClr>
             </a:pPr>
-            <a:endParaRPr lang="en-US" dirty="0" err="1"/>
+            <a:endParaRPr lang="en-US" err="1"/>
           </a:p>
         </p:txBody>
       </p:sp>
@@ -4785,7 +4785,7 @@
                 <a:schemeClr val="bg1"/>
               </a:buClr>
             </a:pPr>
-            <a:endParaRPr lang="en-US" dirty="0" err="1"/>
+            <a:endParaRPr lang="en-US" err="1"/>
           </a:p>
         </p:txBody>
       </p:sp>
@@ -4841,7 +4841,7 @@
                 <a:schemeClr val="bg1"/>
               </a:buClr>
             </a:pPr>
-            <a:endParaRPr lang="en-US" dirty="0" err="1"/>
+            <a:endParaRPr lang="en-US" err="1"/>
           </a:p>
         </p:txBody>
       </p:sp>
@@ -4897,7 +4897,7 @@
                 <a:schemeClr val="bg1"/>
               </a:buClr>
             </a:pPr>
-            <a:endParaRPr lang="en-US" dirty="0" err="1"/>
+            <a:endParaRPr lang="en-US" err="1"/>
           </a:p>
         </p:txBody>
       </p:sp>
@@ -4953,7 +4953,7 @@
                 <a:schemeClr val="bg1"/>
               </a:buClr>
             </a:pPr>
-            <a:endParaRPr lang="en-US" dirty="0" err="1"/>
+            <a:endParaRPr lang="en-US" err="1"/>
           </a:p>
         </p:txBody>
       </p:sp>
@@ -5009,7 +5009,7 @@
                 <a:schemeClr val="bg1"/>
               </a:buClr>
             </a:pPr>
-            <a:endParaRPr lang="en-US" dirty="0" err="1"/>
+            <a:endParaRPr lang="en-US" err="1"/>
           </a:p>
         </p:txBody>
       </p:sp>
@@ -5065,7 +5065,7 @@
                 <a:schemeClr val="bg1"/>
               </a:buClr>
             </a:pPr>
-            <a:endParaRPr lang="en-US" dirty="0" err="1"/>
+            <a:endParaRPr lang="en-US" err="1"/>
           </a:p>
         </p:txBody>
       </p:sp>
@@ -5121,7 +5121,7 @@
                 <a:schemeClr val="bg1"/>
               </a:buClr>
             </a:pPr>
-            <a:endParaRPr lang="en-US" dirty="0" err="1"/>
+            <a:endParaRPr lang="en-US" err="1"/>
           </a:p>
         </p:txBody>
       </p:sp>
@@ -5177,7 +5177,7 @@
                 <a:schemeClr val="bg1"/>
               </a:buClr>
             </a:pPr>
-            <a:endParaRPr lang="en-US" dirty="0" err="1"/>
+            <a:endParaRPr lang="en-US" err="1"/>
           </a:p>
         </p:txBody>
       </p:sp>
@@ -5233,7 +5233,7 @@
                 <a:schemeClr val="bg1"/>
               </a:buClr>
             </a:pPr>
-            <a:endParaRPr lang="en-US" dirty="0" err="1"/>
+            <a:endParaRPr lang="en-US" err="1"/>
           </a:p>
         </p:txBody>
       </p:sp>
@@ -5264,7 +5264,7 @@
           <a:p>
             <a:pPr lvl="0" algn="r"/>
             <a:r>
-              <a:rPr lang="en-US" dirty="0"/>
+              <a:rPr lang="en-US"/>
               <a:t>Slide title</a:t>
             </a:r>
           </a:p>
@@ -5297,35 +5297,35 @@
           <a:p>
             <a:pPr lvl="0"/>
             <a:r>
-              <a:rPr lang="en-US" dirty="0"/>
+              <a:rPr lang="en-US"/>
               <a:t>First level text</a:t>
             </a:r>
           </a:p>
           <a:p>
             <a:pPr lvl="1"/>
             <a:r>
-              <a:rPr lang="en-US" dirty="0"/>
+              <a:rPr lang="en-US"/>
               <a:t>Second level</a:t>
             </a:r>
           </a:p>
           <a:p>
             <a:pPr lvl="2"/>
             <a:r>
-              <a:rPr lang="en-US" dirty="0"/>
+              <a:rPr lang="en-US"/>
               <a:t>Third level</a:t>
             </a:r>
           </a:p>
           <a:p>
             <a:pPr lvl="3"/>
             <a:r>
-              <a:rPr lang="en-US" dirty="0"/>
+              <a:rPr lang="en-US"/>
               <a:t>Fourth level</a:t>
             </a:r>
           </a:p>
           <a:p>
             <a:pPr lvl="4"/>
             <a:r>
-              <a:rPr lang="en-US" dirty="0"/>
+              <a:rPr lang="en-US"/>
               <a:t>Fifth level</a:t>
             </a:r>
           </a:p>
@@ -5438,7 +5438,7 @@
           <a:p>
             <a:fld id="{33052DD4-CDE3-4E33-AB80-AED4CE4AC39A}" type="datetimeFigureOut">
               <a:rPr lang="en-US" smtClean="0"/>
-              <a:t>11/28/2023</a:t>
+              <a:t>12/4/2023</a:t>
             </a:fld>
             <a:endParaRPr lang="en-US"/>
           </a:p>
@@ -5936,22 +5936,22 @@
           <a:lstStyle/>
           <a:p>
             <a:r>
-              <a:rPr lang="en-US" dirty="0"/>
+              <a:rPr lang="en-US"/>
               <a:t>Atelier 4 – </a:t>
             </a:r>
             <a:r>
-              <a:rPr lang="en-US" dirty="0" err="1"/>
+              <a:rPr lang="en-US" err="1"/>
               <a:t>Moniteur</a:t>
             </a:r>
             <a:r>
-              <a:rPr lang="en-US" dirty="0"/>
+              <a:rPr lang="en-US"/>
               <a:t> </a:t>
             </a:r>
             <a:r>
-              <a:rPr lang="en-US" dirty="0" err="1"/>
+              <a:rPr lang="en-US" err="1"/>
               <a:t>Graphique</a:t>
             </a:r>
-            <a:endParaRPr lang="en-US" b="0" dirty="0"/>
+            <a:endParaRPr lang="en-US" b="0"/>
           </a:p>
         </p:txBody>
       </p:sp>
@@ -5977,7 +5977,7 @@
           <a:lstStyle/>
           <a:p>
             <a:r>
-              <a:rPr lang="en-US" dirty="0"/>
+              <a:rPr lang="en-US"/>
               <a:t>Michael ROGER</a:t>
             </a:r>
           </a:p>
@@ -6070,7 +6070,7 @@
               </a:spcAft>
             </a:pPr>
             <a:r>
-              <a:rPr lang="en-US" dirty="0">
+              <a:rPr lang="en-US">
                 <a:latin typeface="Arial" panose="020B0604020202020204" pitchFamily="34" charset="0"/>
               </a:rPr>
               <a:t>Agenda</a:t>
@@ -6275,7 +6275,7 @@
           </a:lstStyle>
           <a:p>
             <a:r>
-              <a:rPr lang="en-US" dirty="0">
+              <a:rPr lang="en-US">
                 <a:solidFill>
                   <a:schemeClr val="tx1"/>
                 </a:solidFill>
@@ -6481,7 +6481,7 @@
               </a:spcBef>
             </a:pPr>
             <a:r>
-              <a:rPr lang="en-US" dirty="0"/>
+              <a:rPr lang="en-US"/>
               <a:t>Topic</a:t>
             </a:r>
           </a:p>
@@ -6684,7 +6684,7 @@
           </a:lstStyle>
           <a:p>
             <a:r>
-              <a:rPr lang="en-US" dirty="0">
+              <a:rPr lang="en-US">
                 <a:solidFill>
                   <a:schemeClr val="tx1"/>
                 </a:solidFill>
@@ -6819,7 +6819,7 @@
           </a:lstStyle>
           <a:p>
             <a:r>
-              <a:rPr lang="en-US" dirty="0"/>
+              <a:rPr lang="en-US"/>
               <a:t>Topic</a:t>
             </a:r>
           </a:p>
@@ -7022,7 +7022,7 @@
           </a:lstStyle>
           <a:p>
             <a:r>
-              <a:rPr lang="en-US" dirty="0">
+              <a:rPr lang="en-US">
                 <a:solidFill>
                   <a:schemeClr val="tx1"/>
                 </a:solidFill>
@@ -7157,7 +7157,7 @@
           </a:lstStyle>
           <a:p>
             <a:r>
-              <a:rPr lang="en-US" dirty="0"/>
+              <a:rPr lang="en-US"/>
               <a:t>Topic</a:t>
             </a:r>
           </a:p>
@@ -7360,7 +7360,7 @@
           </a:lstStyle>
           <a:p>
             <a:r>
-              <a:rPr lang="en-US" dirty="0">
+              <a:rPr lang="en-US">
                 <a:solidFill>
                   <a:schemeClr val="tx1"/>
                 </a:solidFill>
@@ -7495,7 +7495,7 @@
           </a:lstStyle>
           <a:p>
             <a:r>
-              <a:rPr lang="en-US" dirty="0"/>
+              <a:rPr lang="en-US"/>
               <a:t>Topic</a:t>
             </a:r>
           </a:p>
@@ -7698,7 +7698,7 @@
           </a:lstStyle>
           <a:p>
             <a:r>
-              <a:rPr lang="en-US" dirty="0">
+              <a:rPr lang="en-US">
                 <a:solidFill>
                   <a:schemeClr val="tx1"/>
                 </a:solidFill>
@@ -7833,7 +7833,7 @@
           </a:lstStyle>
           <a:p>
             <a:r>
-              <a:rPr lang="en-US" dirty="0"/>
+              <a:rPr lang="en-US"/>
               <a:t>Topic</a:t>
             </a:r>
           </a:p>
@@ -8036,7 +8036,7 @@
           </a:lstStyle>
           <a:p>
             <a:r>
-              <a:rPr lang="en-US" dirty="0">
+              <a:rPr lang="en-US">
                 <a:solidFill>
                   <a:schemeClr val="tx1"/>
                 </a:solidFill>
@@ -8171,7 +8171,7 @@
           </a:lstStyle>
           <a:p>
             <a:r>
-              <a:rPr lang="en-US" dirty="0"/>
+              <a:rPr lang="en-US"/>
               <a:t>Topic</a:t>
             </a:r>
           </a:p>
@@ -8374,7 +8374,7 @@
           </a:lstStyle>
           <a:p>
             <a:r>
-              <a:rPr lang="en-US" dirty="0">
+              <a:rPr lang="en-US">
                 <a:solidFill>
                   <a:schemeClr val="tx1"/>
                 </a:solidFill>
@@ -8509,7 +8509,7 @@
           </a:lstStyle>
           <a:p>
             <a:r>
-              <a:rPr lang="en-US" dirty="0"/>
+              <a:rPr lang="en-US"/>
               <a:t>Topic</a:t>
             </a:r>
           </a:p>
@@ -8712,7 +8712,7 @@
           </a:lstStyle>
           <a:p>
             <a:r>
-              <a:rPr lang="en-US" dirty="0">
+              <a:rPr lang="en-US">
                 <a:solidFill>
                   <a:schemeClr val="tx1"/>
                 </a:solidFill>
@@ -8847,7 +8847,7 @@
           </a:lstStyle>
           <a:p>
             <a:r>
-              <a:rPr lang="en-US" dirty="0"/>
+              <a:rPr lang="en-US"/>
               <a:t>Topic</a:t>
             </a:r>
           </a:p>
@@ -8879,7 +8879,7 @@
               <a:pPr/>
               <a:t>2</a:t>
             </a:fld>
-            <a:endParaRPr lang="en-US" dirty="0"/>
+            <a:endParaRPr lang="en-US"/>
           </a:p>
         </p:txBody>
       </p:sp>
@@ -8934,7 +8934,7 @@
           <a:bodyPr/>
           <a:lstStyle/>
           <a:p>
-            <a:endParaRPr lang="en-US" dirty="0"/>
+            <a:endParaRPr lang="en-US"/>
           </a:p>
         </p:txBody>
       </p:sp>
@@ -8960,10 +8960,10 @@
           <a:lstStyle/>
           <a:p>
             <a:r>
-              <a:rPr lang="en-US" dirty="0" err="1"/>
+              <a:rPr lang="en-US" err="1"/>
               <a:t>Accelerometre</a:t>
             </a:r>
-            <a:endParaRPr lang="en-US" dirty="0"/>
+            <a:endParaRPr lang="en-US"/>
           </a:p>
         </p:txBody>
       </p:sp>
@@ -9019,71 +9019,71 @@
           <a:lstStyle/>
           <a:p>
             <a:r>
-              <a:rPr lang="en-US" dirty="0" err="1"/>
+              <a:rPr lang="en-US" err="1"/>
               <a:t>Qu’est</a:t>
             </a:r>
             <a:r>
-              <a:rPr lang="en-US" dirty="0"/>
+              <a:rPr lang="en-US"/>
               <a:t> </a:t>
             </a:r>
             <a:r>
-              <a:rPr lang="en-US" dirty="0" err="1"/>
+              <a:rPr lang="en-US" err="1"/>
               <a:t>ce</a:t>
             </a:r>
             <a:r>
-              <a:rPr lang="en-US" dirty="0"/>
+              <a:rPr lang="en-US"/>
               <a:t> </a:t>
             </a:r>
             <a:r>
-              <a:rPr lang="en-US" dirty="0" err="1"/>
+              <a:rPr lang="en-US" err="1"/>
               <a:t>qu’un</a:t>
             </a:r>
             <a:r>
-              <a:rPr lang="en-US" dirty="0"/>
+              <a:rPr lang="en-US"/>
               <a:t> </a:t>
             </a:r>
             <a:r>
-              <a:rPr lang="en-US" dirty="0" err="1"/>
+              <a:rPr lang="en-US" err="1"/>
               <a:t>accelerometre</a:t>
             </a:r>
             <a:r>
-              <a:rPr lang="en-US" dirty="0"/>
+              <a:rPr lang="en-US"/>
               <a:t> ?</a:t>
             </a:r>
           </a:p>
           <a:p>
             <a:r>
-              <a:rPr lang="en-US" dirty="0"/>
+              <a:rPr lang="en-US"/>
               <a:t>Ou </a:t>
             </a:r>
             <a:r>
-              <a:rPr lang="en-US" dirty="0" err="1"/>
+              <a:rPr lang="en-US" err="1"/>
               <a:t>peut</a:t>
             </a:r>
             <a:r>
-              <a:rPr lang="en-US" dirty="0"/>
+              <a:rPr lang="en-US"/>
               <a:t> on le </a:t>
             </a:r>
             <a:r>
-              <a:rPr lang="en-US" dirty="0" err="1"/>
+              <a:rPr lang="en-US" err="1"/>
               <a:t>trouver</a:t>
             </a:r>
             <a:r>
-              <a:rPr lang="en-US" dirty="0"/>
+              <a:rPr lang="en-US"/>
               <a:t> ?</a:t>
             </a:r>
           </a:p>
           <a:p>
             <a:r>
-              <a:rPr lang="en-US" dirty="0"/>
+              <a:rPr lang="en-US"/>
               <a:t>A quoi </a:t>
             </a:r>
             <a:r>
-              <a:rPr lang="en-US" dirty="0" err="1"/>
+              <a:rPr lang="en-US" err="1"/>
               <a:t>sert</a:t>
             </a:r>
             <a:r>
-              <a:rPr lang="en-US" dirty="0"/>
+              <a:rPr lang="en-US"/>
               <a:t> il ?</a:t>
             </a:r>
           </a:p>
@@ -9121,13 +9121,13 @@
               </a:spcAft>
             </a:pPr>
             <a:r>
-              <a:rPr lang="en-US" dirty="0" err="1">
+              <a:rPr lang="en-US" err="1">
                 <a:latin typeface="Arial" panose="020B0604020202020204" pitchFamily="34" charset="0"/>
               </a:rPr>
               <a:t>Accelerometre</a:t>
             </a:r>
             <a:r>
-              <a:rPr lang="en-US" dirty="0">
+              <a:rPr lang="en-US">
                 <a:latin typeface="Arial" panose="020B0604020202020204" pitchFamily="34" charset="0"/>
               </a:rPr>
               <a:t> ?</a:t>
@@ -9161,7 +9161,7 @@
               <a:pPr/>
               <a:t>4</a:t>
             </a:fld>
-            <a:endParaRPr lang="en-US" dirty="0"/>
+            <a:endParaRPr lang="en-US"/>
           </a:p>
         </p:txBody>
       </p:sp>
@@ -9394,7 +9394,7 @@
           <a:lstStyle/>
           <a:p>
             <a:r>
-              <a:rPr lang="fr-FR" b="0" i="0" dirty="0">
+              <a:rPr lang="fr-FR" b="0" i="0">
                 <a:solidFill>
                   <a:srgbClr val="000000"/>
                 </a:solidFill>
@@ -9404,7 +9404,7 @@
               <a:t>Un accéléromètre est un </a:t>
             </a:r>
             <a:r>
-              <a:rPr lang="fr-FR" b="1" i="0" dirty="0">
+              <a:rPr lang="fr-FR" b="1" i="0">
                 <a:solidFill>
                   <a:srgbClr val="000000"/>
                 </a:solidFill>
@@ -9414,7 +9414,7 @@
               <a:t>capteur</a:t>
             </a:r>
             <a:r>
-              <a:rPr lang="fr-FR" b="0" i="0" dirty="0">
+              <a:rPr lang="fr-FR" b="0" i="0">
                 <a:solidFill>
                   <a:srgbClr val="000000"/>
                 </a:solidFill>
@@ -9424,7 +9424,7 @@
               <a:t> qui mesure </a:t>
             </a:r>
             <a:r>
-              <a:rPr lang="fr-FR" b="1" i="0" dirty="0">
+              <a:rPr lang="fr-FR" b="1" i="0">
                 <a:solidFill>
                   <a:srgbClr val="000000"/>
                 </a:solidFill>
@@ -9434,7 +9434,7 @@
               <a:t>l'accélération linéaire d'un objet</a:t>
             </a:r>
             <a:r>
-              <a:rPr lang="fr-FR" b="0" i="0" dirty="0">
+              <a:rPr lang="fr-FR" b="0" i="0">
                 <a:solidFill>
                   <a:srgbClr val="000000"/>
                 </a:solidFill>
@@ -9444,7 +9444,7 @@
               <a:t>. Il est souvent utilisé dans les dispositifs électroniques tels que les smartphones, les tablettes et les montres connectées pour </a:t>
             </a:r>
             <a:r>
-              <a:rPr lang="fr-FR" b="0" i="0" dirty="0">
+              <a:rPr lang="fr-FR" b="0" i="0">
                 <a:solidFill>
                   <a:srgbClr val="7030A0"/>
                 </a:solidFill>
@@ -9454,7 +9454,7 @@
               <a:t>détecter les mouvements de l'appareil</a:t>
             </a:r>
             <a:r>
-              <a:rPr lang="fr-FR" b="0" i="0" dirty="0">
+              <a:rPr lang="fr-FR" b="0" i="0">
                 <a:solidFill>
                   <a:srgbClr val="000000"/>
                 </a:solidFill>
@@ -9463,7 +9463,7 @@
               </a:rPr>
               <a:t>, tels que l'inclinaison, la rotation et les secousses. Les accéléromètres peuvent également être utilisés dans les applications industrielles pour mesurer les vibrations et les chocs dans les machines et les structures.</a:t>
             </a:r>
-            <a:endParaRPr lang="en-US" dirty="0"/>
+            <a:endParaRPr lang="en-US"/>
           </a:p>
         </p:txBody>
       </p:sp>
@@ -9499,49 +9499,49 @@
               </a:spcAft>
             </a:pPr>
             <a:r>
-              <a:rPr lang="en-US" dirty="0" err="1">
+              <a:rPr lang="en-US" err="1">
                 <a:latin typeface="Arial" panose="020B0604020202020204" pitchFamily="34" charset="0"/>
               </a:rPr>
               <a:t>Qu’est</a:t>
             </a:r>
             <a:r>
-              <a:rPr lang="en-US" dirty="0">
+              <a:rPr lang="en-US">
                 <a:latin typeface="Arial" panose="020B0604020202020204" pitchFamily="34" charset="0"/>
               </a:rPr>
               <a:t> </a:t>
             </a:r>
             <a:r>
-              <a:rPr lang="en-US" dirty="0" err="1">
+              <a:rPr lang="en-US" err="1">
                 <a:latin typeface="Arial" panose="020B0604020202020204" pitchFamily="34" charset="0"/>
               </a:rPr>
               <a:t>ce</a:t>
             </a:r>
             <a:r>
-              <a:rPr lang="en-US" dirty="0">
+              <a:rPr lang="en-US">
                 <a:latin typeface="Arial" panose="020B0604020202020204" pitchFamily="34" charset="0"/>
               </a:rPr>
               <a:t> </a:t>
             </a:r>
             <a:r>
-              <a:rPr lang="en-US" dirty="0" err="1">
+              <a:rPr lang="en-US" err="1">
                 <a:latin typeface="Arial" panose="020B0604020202020204" pitchFamily="34" charset="0"/>
               </a:rPr>
               <a:t>qu’un</a:t>
             </a:r>
             <a:r>
-              <a:rPr lang="en-US" dirty="0">
+              <a:rPr lang="en-US">
                 <a:latin typeface="Arial" panose="020B0604020202020204" pitchFamily="34" charset="0"/>
               </a:rPr>
               <a:t> </a:t>
             </a:r>
             <a:r>
-              <a:rPr lang="en-US" dirty="0" err="1">
+              <a:rPr lang="en-US" err="1">
                 <a:latin typeface="Arial" panose="020B0604020202020204" pitchFamily="34" charset="0"/>
               </a:rPr>
               <a:t>accelerometre</a:t>
             </a:r>
             <a:r>
-              <a:rPr lang="en-US" dirty="0">
+              <a:rPr lang="en-US">
                 <a:latin typeface="Arial" panose="020B0604020202020204" pitchFamily="34" charset="0"/>
               </a:rPr>
               <a:t> ?</a:t>
@@ -9575,7 +9575,7 @@
               <a:pPr/>
               <a:t>5</a:t>
             </a:fld>
-            <a:endParaRPr lang="en-US" dirty="0"/>
+            <a:endParaRPr lang="en-US"/>
           </a:p>
         </p:txBody>
       </p:sp>
@@ -9630,7 +9630,7 @@
           <a:bodyPr/>
           <a:lstStyle/>
           <a:p>
-            <a:endParaRPr lang="en-US" dirty="0"/>
+            <a:endParaRPr lang="en-US"/>
           </a:p>
         </p:txBody>
       </p:sp>
@@ -9656,7 +9656,7 @@
           <a:lstStyle/>
           <a:p>
             <a:r>
-              <a:rPr lang="en-US" dirty="0"/>
+              <a:rPr lang="en-US"/>
               <a:t>Exercises</a:t>
             </a:r>
           </a:p>
@@ -9716,234 +9716,234 @@
           <a:lstStyle/>
           <a:p>
             <a:r>
-              <a:rPr lang="en-US" dirty="0" err="1"/>
+              <a:rPr lang="en-US" err="1"/>
               <a:t>Retrouver</a:t>
             </a:r>
             <a:r>
-              <a:rPr lang="en-US" dirty="0"/>
+              <a:rPr lang="en-US"/>
               <a:t> les positions X, Y, Z a </a:t>
             </a:r>
             <a:r>
-              <a:rPr lang="en-US" dirty="0" err="1"/>
+              <a:rPr lang="en-US" err="1"/>
               <a:t>partir</a:t>
             </a:r>
             <a:r>
-              <a:rPr lang="en-US" dirty="0"/>
+              <a:rPr lang="en-US"/>
               <a:t> du </a:t>
             </a:r>
             <a:r>
-              <a:rPr lang="en-US" dirty="0" err="1"/>
+              <a:rPr lang="en-US" err="1"/>
               <a:t>logiciel</a:t>
             </a:r>
             <a:r>
-              <a:rPr lang="en-US" dirty="0"/>
+              <a:rPr lang="en-US"/>
               <a:t> de test</a:t>
             </a:r>
           </a:p>
           <a:p>
             <a:r>
-              <a:rPr lang="en-US" dirty="0" err="1"/>
+              <a:rPr lang="en-US" err="1"/>
               <a:t>Quelles</a:t>
             </a:r>
             <a:r>
-              <a:rPr lang="en-US" dirty="0"/>
+              <a:rPr lang="en-US"/>
               <a:t> </a:t>
             </a:r>
             <a:r>
-              <a:rPr lang="en-US" dirty="0" err="1"/>
+              <a:rPr lang="en-US" err="1"/>
               <a:t>valeurs</a:t>
             </a:r>
             <a:r>
-              <a:rPr lang="en-US" dirty="0"/>
+              <a:rPr lang="en-US"/>
               <a:t> max </a:t>
             </a:r>
             <a:r>
-              <a:rPr lang="en-US" dirty="0" err="1"/>
+              <a:rPr lang="en-US" err="1"/>
               <a:t>peut</a:t>
             </a:r>
             <a:r>
-              <a:rPr lang="en-US" dirty="0"/>
+              <a:rPr lang="en-US"/>
               <a:t>-on </a:t>
             </a:r>
             <a:r>
-              <a:rPr lang="en-US" dirty="0" err="1"/>
+              <a:rPr lang="en-US" err="1"/>
               <a:t>avoir</a:t>
             </a:r>
             <a:r>
-              <a:rPr lang="en-US" dirty="0"/>
+              <a:rPr lang="en-US"/>
               <a:t> pour X, Y et Z</a:t>
             </a:r>
           </a:p>
           <a:p>
             <a:r>
-              <a:rPr lang="en-US" dirty="0" err="1"/>
+              <a:rPr lang="en-US" err="1"/>
               <a:t>Deplacer</a:t>
             </a:r>
             <a:r>
-              <a:rPr lang="en-US" dirty="0"/>
+              <a:rPr lang="en-US"/>
               <a:t> </a:t>
             </a:r>
             <a:r>
-              <a:rPr lang="en-US" dirty="0" err="1"/>
+              <a:rPr lang="en-US" err="1"/>
               <a:t>l’accelerometre</a:t>
             </a:r>
             <a:r>
-              <a:rPr lang="en-US" dirty="0"/>
+              <a:rPr lang="en-US"/>
               <a:t> pour le faire changer que X, Y </a:t>
             </a:r>
             <a:r>
-              <a:rPr lang="en-US" dirty="0" err="1"/>
+              <a:rPr lang="en-US" err="1"/>
               <a:t>ou</a:t>
             </a:r>
             <a:r>
-              <a:rPr lang="en-US" dirty="0"/>
+              <a:rPr lang="en-US"/>
               <a:t> Z</a:t>
             </a:r>
           </a:p>
           <a:p>
             <a:r>
-              <a:rPr lang="en-US" dirty="0"/>
+              <a:rPr lang="en-US"/>
               <a:t>Modifier le </a:t>
             </a:r>
             <a:r>
-              <a:rPr lang="en-US" dirty="0" err="1"/>
+              <a:rPr lang="en-US" err="1"/>
               <a:t>programme</a:t>
             </a:r>
             <a:r>
-              <a:rPr lang="en-US" dirty="0"/>
+              <a:rPr lang="en-US"/>
               <a:t> pour</a:t>
             </a:r>
           </a:p>
           <a:p>
             <a:pPr lvl="1"/>
             <a:r>
-              <a:rPr lang="en-US" dirty="0"/>
+              <a:rPr lang="en-US"/>
               <a:t>Faire </a:t>
             </a:r>
             <a:r>
-              <a:rPr lang="en-US" dirty="0" err="1"/>
+              <a:rPr lang="en-US" err="1"/>
               <a:t>allumer</a:t>
             </a:r>
             <a:r>
-              <a:rPr lang="en-US" dirty="0"/>
+              <a:rPr lang="en-US"/>
               <a:t> la LED rouge </a:t>
             </a:r>
             <a:r>
-              <a:rPr lang="en-US" dirty="0" err="1"/>
+              <a:rPr lang="en-US" err="1"/>
               <a:t>lorsque</a:t>
             </a:r>
             <a:r>
-              <a:rPr lang="en-US" dirty="0"/>
+              <a:rPr lang="en-US"/>
               <a:t> X </a:t>
             </a:r>
             <a:r>
-              <a:rPr lang="en-US" dirty="0" err="1"/>
+              <a:rPr lang="en-US" err="1"/>
               <a:t>est</a:t>
             </a:r>
             <a:r>
-              <a:rPr lang="en-US" dirty="0"/>
+              <a:rPr lang="en-US"/>
               <a:t> </a:t>
             </a:r>
             <a:r>
-              <a:rPr lang="en-US" dirty="0" err="1"/>
+              <a:rPr lang="en-US" err="1"/>
               <a:t>compris</a:t>
             </a:r>
             <a:r>
-              <a:rPr lang="en-US" dirty="0"/>
+              <a:rPr lang="en-US"/>
               <a:t> entre 0 et 30</a:t>
             </a:r>
           </a:p>
           <a:p>
             <a:pPr lvl="1"/>
             <a:r>
-              <a:rPr lang="en-US" dirty="0"/>
+              <a:rPr lang="en-US"/>
               <a:t>Faire </a:t>
             </a:r>
             <a:r>
-              <a:rPr lang="en-US" dirty="0" err="1"/>
+              <a:rPr lang="en-US" err="1"/>
               <a:t>allumer</a:t>
             </a:r>
             <a:r>
-              <a:rPr lang="en-US" dirty="0"/>
+              <a:rPr lang="en-US"/>
               <a:t> la LED </a:t>
             </a:r>
             <a:r>
-              <a:rPr lang="en-US" dirty="0" err="1"/>
+              <a:rPr lang="en-US" err="1"/>
               <a:t>verte</a:t>
             </a:r>
             <a:r>
-              <a:rPr lang="en-US" dirty="0"/>
+              <a:rPr lang="en-US"/>
               <a:t> </a:t>
             </a:r>
             <a:r>
-              <a:rPr lang="en-US" dirty="0" err="1"/>
+              <a:rPr lang="en-US" err="1"/>
               <a:t>lorsque</a:t>
             </a:r>
             <a:r>
-              <a:rPr lang="en-US" dirty="0"/>
+              <a:rPr lang="en-US"/>
               <a:t> Y </a:t>
             </a:r>
             <a:r>
-              <a:rPr lang="en-US" dirty="0" err="1"/>
+              <a:rPr lang="en-US" err="1"/>
               <a:t>est</a:t>
             </a:r>
             <a:r>
-              <a:rPr lang="en-US" dirty="0"/>
+              <a:rPr lang="en-US"/>
               <a:t> </a:t>
             </a:r>
             <a:r>
-              <a:rPr lang="en-US" dirty="0" err="1"/>
+              <a:rPr lang="en-US" err="1"/>
               <a:t>compris</a:t>
             </a:r>
             <a:r>
-              <a:rPr lang="en-US" dirty="0"/>
+              <a:rPr lang="en-US"/>
               <a:t> entre 0 et 30</a:t>
             </a:r>
           </a:p>
           <a:p>
             <a:pPr lvl="1"/>
             <a:r>
-              <a:rPr lang="en-US" dirty="0"/>
+              <a:rPr lang="en-US"/>
               <a:t>Faire </a:t>
             </a:r>
             <a:r>
-              <a:rPr lang="en-US" dirty="0" err="1"/>
+              <a:rPr lang="en-US" err="1"/>
               <a:t>allumer</a:t>
             </a:r>
             <a:r>
-              <a:rPr lang="en-US" dirty="0"/>
+              <a:rPr lang="en-US"/>
               <a:t> la LED </a:t>
             </a:r>
             <a:r>
-              <a:rPr lang="en-US" dirty="0" err="1"/>
+              <a:rPr lang="en-US" err="1"/>
               <a:t>bleue</a:t>
             </a:r>
             <a:r>
-              <a:rPr lang="en-US" dirty="0"/>
+              <a:rPr lang="en-US"/>
               <a:t> </a:t>
             </a:r>
             <a:r>
-              <a:rPr lang="en-US" dirty="0" err="1"/>
+              <a:rPr lang="en-US" err="1"/>
               <a:t>lorsque</a:t>
             </a:r>
             <a:r>
-              <a:rPr lang="en-US" dirty="0"/>
+              <a:rPr lang="en-US"/>
               <a:t> Z </a:t>
             </a:r>
             <a:r>
-              <a:rPr lang="en-US" dirty="0" err="1"/>
+              <a:rPr lang="en-US" err="1"/>
               <a:t>est</a:t>
             </a:r>
             <a:r>
-              <a:rPr lang="en-US" dirty="0"/>
+              <a:rPr lang="en-US"/>
               <a:t> </a:t>
             </a:r>
             <a:r>
-              <a:rPr lang="en-US" dirty="0" err="1"/>
+              <a:rPr lang="en-US" err="1"/>
               <a:t>compris</a:t>
             </a:r>
             <a:r>
-              <a:rPr lang="en-US" dirty="0"/>
+              <a:rPr lang="en-US"/>
               <a:t> entre 0 et 30</a:t>
             </a:r>
           </a:p>
@@ -9953,46 +9953,40 @@
               <a:rPr lang="en-US">
                 <a:cs typeface="Arial"/>
               </a:rPr>
-              <a:t>Retirer</a:t>
-            </a:r>
-            <a:r>
-              <a:rPr lang="en-US" dirty="0">
+              <a:t>Retirer </a:t>
+            </a:r>
+            <a:r>
+              <a:rPr lang="en-US" err="1">
+                <a:cs typeface="Arial"/>
+              </a:rPr>
+              <a:t>l’offset</a:t>
+            </a:r>
+            <a:r>
+              <a:rPr lang="en-US">
+                <a:cs typeface="Arial"/>
+              </a:rPr>
+              <a:t> des </a:t>
+            </a:r>
+            <a:r>
+              <a:rPr lang="en-US" err="1">
+                <a:cs typeface="Arial"/>
+              </a:rPr>
+              <a:t>valeurs</a:t>
+            </a:r>
+            <a:r>
+              <a:rPr lang="en-US">
                 <a:cs typeface="Arial"/>
               </a:rPr>
               <a:t> </a:t>
             </a:r>
             <a:r>
-              <a:rPr lang="en-US" dirty="0" err="1">
-                <a:cs typeface="Arial"/>
-              </a:rPr>
-              <a:t>l’offset</a:t>
-            </a:r>
-            <a:r>
-              <a:rPr lang="en-US" dirty="0">
-                <a:cs typeface="Arial"/>
-              </a:rPr>
-              <a:t> des </a:t>
-            </a:r>
-            <a:r>
-              <a:rPr lang="en-US" dirty="0" err="1">
-                <a:cs typeface="Arial"/>
-              </a:rPr>
-              <a:t>valeurs</a:t>
-            </a:r>
-            <a:r>
-              <a:rPr lang="en-US" dirty="0">
-                <a:cs typeface="Arial"/>
-              </a:rPr>
-              <a:t> </a:t>
-            </a:r>
-            <a:r>
-              <a:rPr lang="en-US" dirty="0" err="1">
+              <a:rPr lang="en-US" err="1">
                 <a:cs typeface="Arial"/>
               </a:rPr>
               <a:t>x,y</a:t>
             </a:r>
             <a:r>
-              <a:rPr lang="en-US" dirty="0">
+              <a:rPr lang="en-US">
                 <a:cs typeface="Arial"/>
               </a:rPr>
               <a:t>, z</a:t>
@@ -10001,7 +9995,7 @@
           <a:p>
             <a:pPr marL="261620" indent="-261620"/>
             <a:r>
-              <a:rPr lang="en-US" dirty="0">
+              <a:rPr lang="en-US">
                 <a:cs typeface="Arial"/>
               </a:rPr>
               <a:t>Creer le zero avec z – x – y =&gt; </a:t>
@@ -10013,7 +10007,7 @@
               <a:t>afficher</a:t>
             </a:r>
             <a:r>
-              <a:rPr lang="en-US" dirty="0">
+              <a:rPr lang="en-US">
                 <a:cs typeface="Arial"/>
               </a:rPr>
               <a:t> =&gt; essayer </a:t>
@@ -10034,12 +10028,12 @@
           </a:p>
           <a:p>
             <a:pPr marL="261620" indent="-261620"/>
-            <a:endParaRPr lang="en-US" dirty="0">
+            <a:endParaRPr lang="en-US">
               <a:cs typeface="Arial"/>
             </a:endParaRPr>
           </a:p>
           <a:p>
-            <a:endParaRPr lang="en-US" dirty="0"/>
+            <a:endParaRPr lang="en-US"/>
           </a:p>
         </p:txBody>
       </p:sp>
@@ -10075,12 +10069,12 @@
               </a:spcAft>
             </a:pPr>
             <a:r>
-              <a:rPr lang="en-US" dirty="0" err="1">
+              <a:rPr lang="en-US" err="1">
                 <a:latin typeface="Arial" panose="020B0604020202020204" pitchFamily="34" charset="0"/>
               </a:rPr>
               <a:t>Exercices</a:t>
             </a:r>
-            <a:endParaRPr lang="en-US" dirty="0">
+            <a:endParaRPr lang="en-US">
               <a:latin typeface="Arial" panose="020B0604020202020204" pitchFamily="34" charset="0"/>
             </a:endParaRPr>
           </a:p>
@@ -10112,7 +10106,7 @@
               <a:pPr/>
               <a:t>7</a:t>
             </a:fld>
-            <a:endParaRPr lang="en-US" dirty="0"/>
+            <a:endParaRPr lang="en-US"/>
           </a:p>
         </p:txBody>
       </p:sp>
@@ -10710,17 +10704,8 @@
 </file>
 
 <file path=customXml/item2.xml><?xml version="1.0" encoding="utf-8"?>
-<?mso-contentType ?>
-<FormTemplates xmlns="http://schemas.microsoft.com/sharepoint/v3/contenttype/forms">
-  <Display>DocumentLibraryForm</Display>
-  <Edit>DocumentLibraryForm</Edit>
-  <New>DocumentLibraryForm</New>
-</FormTemplates>
-</file>
-
-<file path=customXml/item3.xml><?xml version="1.0" encoding="utf-8"?>
-<ct:contentTypeSchema xmlns:ct="http://schemas.microsoft.com/office/2006/metadata/contentType" xmlns:ma="http://schemas.microsoft.com/office/2006/metadata/properties/metaAttributes" ct:_="" ma:_="" ma:contentTypeName="Document" ma:contentTypeID="0x010100DC0760A7AE261344AC58876745C197A8" ma:contentTypeVersion="11" ma:contentTypeDescription="Create a new document." ma:contentTypeScope="" ma:versionID="70496d3d75803c1c348a613bdecde5a4">
-  <xsd:schema xmlns:xsd="http://www.w3.org/2001/XMLSchema" xmlns:xs="http://www.w3.org/2001/XMLSchema" xmlns:p="http://schemas.microsoft.com/office/2006/metadata/properties" xmlns:ns2="57009294-c050-4c1f-936f-8a3f929a7959" xmlns:ns3="1d88044a-9ac9-42ee-a6f5-1edcea8fe7ff" targetNamespace="http://schemas.microsoft.com/office/2006/metadata/properties" ma:root="true" ma:fieldsID="10a9c6b0080e6ebdce9e26b2141f2674" ns2:_="" ns3:_="">
+<ct:contentTypeSchema xmlns:ct="http://schemas.microsoft.com/office/2006/metadata/contentType" xmlns:ma="http://schemas.microsoft.com/office/2006/metadata/properties/metaAttributes" ct:_="" ma:_="" ma:contentTypeName="Document" ma:contentTypeID="0x010100DC0760A7AE261344AC58876745C197A8" ma:contentTypeVersion="13" ma:contentTypeDescription="Create a new document." ma:contentTypeScope="" ma:versionID="42c4b3de7303bd7e10f6b94b8ad8d067">
+  <xsd:schema xmlns:xsd="http://www.w3.org/2001/XMLSchema" xmlns:xs="http://www.w3.org/2001/XMLSchema" xmlns:p="http://schemas.microsoft.com/office/2006/metadata/properties" xmlns:ns2="57009294-c050-4c1f-936f-8a3f929a7959" xmlns:ns3="1d88044a-9ac9-42ee-a6f5-1edcea8fe7ff" targetNamespace="http://schemas.microsoft.com/office/2006/metadata/properties" ma:root="true" ma:fieldsID="924eca24bc080f6db63150ee75aa1b11" ns2:_="" ns3:_="">
     <xsd:import namespace="57009294-c050-4c1f-936f-8a3f929a7959"/>
     <xsd:import namespace="1d88044a-9ac9-42ee-a6f5-1edcea8fe7ff"/>
     <xsd:element name="properties">
@@ -10739,6 +10724,8 @@
                 <xsd:element ref="ns2:MediaServiceEventHashCode" minOccurs="0"/>
                 <xsd:element ref="ns2:MediaServiceDateTaken" minOccurs="0"/>
                 <xsd:element ref="ns2:MediaLengthInSeconds" minOccurs="0"/>
+                <xsd:element ref="ns3:SharedWithUsers" minOccurs="0"/>
+                <xsd:element ref="ns3:SharedWithDetails" minOccurs="0"/>
               </xsd:all>
             </xsd:complexType>
           </xsd:element>
@@ -10812,6 +10799,32 @@
           </xsd:extension>
         </xsd:complexContent>
       </xsd:complexType>
+    </xsd:element>
+    <xsd:element name="SharedWithUsers" ma:index="19" nillable="true" ma:displayName="Shared With" ma:internalName="SharedWithUsers" ma:readOnly="true">
+      <xsd:complexType>
+        <xsd:complexContent>
+          <xsd:extension base="dms:UserMulti">
+            <xsd:sequence>
+              <xsd:element name="UserInfo" minOccurs="0" maxOccurs="unbounded">
+                <xsd:complexType>
+                  <xsd:sequence>
+                    <xsd:element name="DisplayName" type="xsd:string" minOccurs="0"/>
+                    <xsd:element name="AccountId" type="dms:UserId" minOccurs="0" nillable="true"/>
+                    <xsd:element name="AccountType" type="xsd:string" minOccurs="0"/>
+                  </xsd:sequence>
+                </xsd:complexType>
+              </xsd:element>
+            </xsd:sequence>
+          </xsd:extension>
+        </xsd:complexContent>
+      </xsd:complexType>
+    </xsd:element>
+    <xsd:element name="SharedWithDetails" ma:index="20" nillable="true" ma:displayName="Shared With Details" ma:internalName="SharedWithDetails" ma:readOnly="true">
+      <xsd:simpleType>
+        <xsd:restriction base="dms:Note">
+          <xsd:maxLength value="255"/>
+        </xsd:restriction>
+      </xsd:simpleType>
     </xsd:element>
   </xsd:schema>
   <xsd:schema xmlns="http://schemas.openxmlformats.org/package/2006/metadata/core-properties" xmlns:xsd="http://www.w3.org/2001/XMLSchema" xmlns:xsi="http://www.w3.org/2001/XMLSchema-instance" xmlns:dc="http://purl.org/dc/elements/1.1/" xmlns:dcterms="http://purl.org/dc/terms/" xmlns:odoc="http://schemas.microsoft.com/internal/obd" targetNamespace="http://schemas.openxmlformats.org/package/2006/metadata/core-properties" elementFormDefault="qualified" attributeFormDefault="unqualified" blockDefault="#all">
@@ -10913,25 +10926,34 @@
 </ct:contentTypeSchema>
 </file>
 
+<file path=customXml/item3.xml><?xml version="1.0" encoding="utf-8"?>
+<?mso-contentType ?>
+<FormTemplates xmlns="http://schemas.microsoft.com/sharepoint/v3/contenttype/forms">
+  <Display>DocumentLibraryForm</Display>
+  <Edit>DocumentLibraryForm</Edit>
+  <New>DocumentLibraryForm</New>
+</FormTemplates>
+</file>
+
 <file path=customXml/itemProps1.xml><?xml version="1.0" encoding="utf-8"?>
 <ds:datastoreItem xmlns:ds="http://schemas.openxmlformats.org/officeDocument/2006/customXml" ds:itemID="{D4D8CB15-F8FD-4A0B-9939-F7A0F2CC3A7F}">
   <ds:schemaRefs>
+    <ds:schemaRef ds:uri="1d88044a-9ac9-42ee-a6f5-1edcea8fe7ff"/>
+    <ds:schemaRef ds:uri="57009294-c050-4c1f-936f-8a3f929a7959"/>
     <ds:schemaRef ds:uri="http://schemas.microsoft.com/office/2006/metadata/properties"/>
     <ds:schemaRef ds:uri="http://schemas.microsoft.com/office/infopath/2007/PartnerControls"/>
-    <ds:schemaRef ds:uri="1d88044a-9ac9-42ee-a6f5-1edcea8fe7ff"/>
-    <ds:schemaRef ds:uri="57009294-c050-4c1f-936f-8a3f929a7959"/>
   </ds:schemaRefs>
 </ds:datastoreItem>
 </file>
 
 <file path=customXml/itemProps2.xml><?xml version="1.0" encoding="utf-8"?>
+<ds:datastoreItem xmlns:ds="http://schemas.openxmlformats.org/officeDocument/2006/customXml" ds:itemID="{02B99226-5DF5-4645-87D8-2876CFBBEEA6}"/>
+</file>
+
+<file path=customXml/itemProps3.xml><?xml version="1.0" encoding="utf-8"?>
 <ds:datastoreItem xmlns:ds="http://schemas.openxmlformats.org/officeDocument/2006/customXml" ds:itemID="{3A9BF77F-BBAF-4FF9-805C-394A70E855AD}">
   <ds:schemaRefs>
     <ds:schemaRef ds:uri="http://schemas.microsoft.com/sharepoint/v3/contenttype/forms"/>
   </ds:schemaRefs>
 </ds:datastoreItem>
-</file>
-
-<file path=customXml/itemProps3.xml><?xml version="1.0" encoding="utf-8"?>
-<ds:datastoreItem xmlns:ds="http://schemas.openxmlformats.org/officeDocument/2006/customXml" ds:itemID="{ABB7FCAA-2793-451B-BD2F-4C15D3D0BE71}"/>
 </file>
</xml_diff>